<commit_message>
moving 2022 midterm into its own directory
</commit_message>
<xml_diff>
--- a/docs/slides/06-Features.pptx
+++ b/docs/slides/06-Features.pptx
@@ -224,7 +224,7 @@
           <a:p>
             <a:fld id="{7C647723-25B9-CF47-A216-173A2D9E2DD6}" type="datetimeFigureOut">
               <a:rPr lang="en-US" smtClean="0"/>
-              <a:t>10/11/22</a:t>
+              <a:t>10/16/23</a:t>
             </a:fld>
             <a:endParaRPr lang="en-US"/>
           </a:p>
@@ -389,7 +389,7 @@
           <a:p>
             <a:fld id="{62ECFB24-C06C-DE40-B28C-DA8348A9C824}" type="datetimeFigureOut">
               <a:rPr lang="en-US" smtClean="0"/>
-              <a:t>10/11/22</a:t>
+              <a:t>10/16/23</a:t>
             </a:fld>
             <a:endParaRPr lang="en-US"/>
           </a:p>
@@ -803,7 +803,7 @@
           <a:p>
             <a:fld id="{C9A5E26F-99F5-6042-9D19-5B565D0B360D}" type="datetimeFigureOut">
               <a:rPr lang="en-US" smtClean="0"/>
-              <a:t>10/11/22</a:t>
+              <a:t>10/16/23</a:t>
             </a:fld>
             <a:endParaRPr lang="en-US"/>
           </a:p>
@@ -1001,7 +1001,7 @@
           <a:p>
             <a:fld id="{C9A5E26F-99F5-6042-9D19-5B565D0B360D}" type="datetimeFigureOut">
               <a:rPr lang="en-US" smtClean="0"/>
-              <a:t>10/11/22</a:t>
+              <a:t>10/16/23</a:t>
             </a:fld>
             <a:endParaRPr lang="en-US"/>
           </a:p>
@@ -1209,7 +1209,7 @@
           <a:p>
             <a:fld id="{C9A5E26F-99F5-6042-9D19-5B565D0B360D}" type="datetimeFigureOut">
               <a:rPr lang="en-US" smtClean="0"/>
-              <a:t>10/11/22</a:t>
+              <a:t>10/16/23</a:t>
             </a:fld>
             <a:endParaRPr lang="en-US"/>
           </a:p>
@@ -1829,7 +1829,7 @@
           <a:p>
             <a:fld id="{C9A5E26F-99F5-6042-9D19-5B565D0B360D}" type="datetimeFigureOut">
               <a:rPr lang="en-US" smtClean="0"/>
-              <a:t>10/11/22</a:t>
+              <a:t>10/16/23</a:t>
             </a:fld>
             <a:endParaRPr lang="en-US"/>
           </a:p>
@@ -2104,7 +2104,7 @@
           <a:p>
             <a:fld id="{C9A5E26F-99F5-6042-9D19-5B565D0B360D}" type="datetimeFigureOut">
               <a:rPr lang="en-US" smtClean="0"/>
-              <a:t>10/11/22</a:t>
+              <a:t>10/16/23</a:t>
             </a:fld>
             <a:endParaRPr lang="en-US"/>
           </a:p>
@@ -2369,7 +2369,7 @@
           <a:p>
             <a:fld id="{C9A5E26F-99F5-6042-9D19-5B565D0B360D}" type="datetimeFigureOut">
               <a:rPr lang="en-US" smtClean="0"/>
-              <a:t>10/11/22</a:t>
+              <a:t>10/16/23</a:t>
             </a:fld>
             <a:endParaRPr lang="en-US"/>
           </a:p>
@@ -2781,7 +2781,7 @@
           <a:p>
             <a:fld id="{C9A5E26F-99F5-6042-9D19-5B565D0B360D}" type="datetimeFigureOut">
               <a:rPr lang="en-US" smtClean="0"/>
-              <a:t>10/11/22</a:t>
+              <a:t>10/16/23</a:t>
             </a:fld>
             <a:endParaRPr lang="en-US"/>
           </a:p>
@@ -2922,7 +2922,7 @@
           <a:p>
             <a:fld id="{C9A5E26F-99F5-6042-9D19-5B565D0B360D}" type="datetimeFigureOut">
               <a:rPr lang="en-US" smtClean="0"/>
-              <a:t>10/11/22</a:t>
+              <a:t>10/16/23</a:t>
             </a:fld>
             <a:endParaRPr lang="en-US"/>
           </a:p>
@@ -3035,7 +3035,7 @@
           <a:p>
             <a:fld id="{C9A5E26F-99F5-6042-9D19-5B565D0B360D}" type="datetimeFigureOut">
               <a:rPr lang="en-US" smtClean="0"/>
-              <a:t>10/11/22</a:t>
+              <a:t>10/16/23</a:t>
             </a:fld>
             <a:endParaRPr lang="en-US"/>
           </a:p>
@@ -3346,7 +3346,7 @@
           <a:p>
             <a:fld id="{C9A5E26F-99F5-6042-9D19-5B565D0B360D}" type="datetimeFigureOut">
               <a:rPr lang="en-US" smtClean="0"/>
-              <a:t>10/11/22</a:t>
+              <a:t>10/16/23</a:t>
             </a:fld>
             <a:endParaRPr lang="en-US"/>
           </a:p>
@@ -3634,7 +3634,7 @@
           <a:p>
             <a:fld id="{C9A5E26F-99F5-6042-9D19-5B565D0B360D}" type="datetimeFigureOut">
               <a:rPr lang="en-US" smtClean="0"/>
-              <a:t>10/11/22</a:t>
+              <a:t>10/16/23</a:t>
             </a:fld>
             <a:endParaRPr lang="en-US"/>
           </a:p>
@@ -3875,7 +3875,7 @@
           <a:p>
             <a:fld id="{C9A5E26F-99F5-6042-9D19-5B565D0B360D}" type="datetimeFigureOut">
               <a:rPr lang="en-US" smtClean="0"/>
-              <a:t>10/11/22</a:t>
+              <a:t>10/16/23</a:t>
             </a:fld>
             <a:endParaRPr lang="en-US"/>
           </a:p>
@@ -4591,9 +4591,10 @@
           <a:lstStyle/>
           <a:p>
             <a:r>
-              <a:rPr lang="en-US" dirty="0"/>
-              <a:t>Statistical Features</a:t>
-            </a:r>
+              <a:rPr lang="en-US"/>
+              <a:t>Statistical Features (STAT)</a:t>
+            </a:r>
+            <a:endParaRPr lang="en-US" dirty="0"/>
           </a:p>
         </p:txBody>
       </p:sp>

</xml_diff>